<commit_message>
Change a little bit.
</commit_message>
<xml_diff>
--- a/Presentation.pptx
+++ b/Presentation.pptx
@@ -268,7 +268,7 @@
           <a:p>
             <a:fld id="{E3775AAE-0936-40B9-ACF9-A981EEF95D23}" type="datetimeFigureOut">
               <a:rPr lang="en-US" smtClean="0"/>
-              <a:t>5/22/2022</a:t>
+              <a:t>5/23/2022</a:t>
             </a:fld>
             <a:endParaRPr lang="en-US"/>
           </a:p>
@@ -2091,7 +2091,7 @@
           <a:p>
             <a:fld id="{78ABE3C1-DBE1-495D-B57B-2849774B866A}" type="datetimeFigureOut">
               <a:rPr lang="en-US" dirty="0"/>
-              <a:t>5/22/2022</a:t>
+              <a:t>5/23/2022</a:t>
             </a:fld>
             <a:endParaRPr lang="en-US" dirty="0"/>
           </a:p>
@@ -2512,7 +2512,7 @@
           <a:p>
             <a:fld id="{446C117F-5CCF-4837-BE5F-2B92066CAFAF}" type="datetimeFigureOut">
               <a:rPr lang="en-US" dirty="0"/>
-              <a:t>5/22/2022</a:t>
+              <a:t>5/23/2022</a:t>
             </a:fld>
             <a:endParaRPr lang="en-US" dirty="0"/>
           </a:p>
@@ -2855,7 +2855,7 @@
           <a:p>
             <a:fld id="{84EB90BD-B6CE-46B7-997F-7313B992CCDC}" type="datetimeFigureOut">
               <a:rPr lang="en-US" dirty="0"/>
-              <a:t>5/22/2022</a:t>
+              <a:t>5/23/2022</a:t>
             </a:fld>
             <a:endParaRPr lang="en-US" dirty="0"/>
           </a:p>
@@ -3267,7 +3267,7 @@
           <a:p>
             <a:fld id="{CDB9D11F-B188-461D-B23F-39381795C052}" type="datetimeFigureOut">
               <a:rPr lang="en-US" dirty="0"/>
-              <a:t>5/22/2022</a:t>
+              <a:t>5/23/2022</a:t>
             </a:fld>
             <a:endParaRPr lang="en-US" dirty="0"/>
           </a:p>
@@ -3842,7 +3842,7 @@
           <a:p>
             <a:fld id="{52E6D8D9-55A2-4063-B0F3-121F44549695}" type="datetimeFigureOut">
               <a:rPr lang="en-US" dirty="0"/>
-              <a:t>5/22/2022</a:t>
+              <a:t>5/23/2022</a:t>
             </a:fld>
             <a:endParaRPr lang="en-US" dirty="0"/>
           </a:p>
@@ -4530,7 +4530,7 @@
           <a:p>
             <a:fld id="{D4B24536-994D-4021-A283-9F449C0DB509}" type="datetimeFigureOut">
               <a:rPr lang="en-US" dirty="0"/>
-              <a:t>5/22/2022</a:t>
+              <a:t>5/23/2022</a:t>
             </a:fld>
             <a:endParaRPr lang="en-US" dirty="0"/>
           </a:p>
@@ -5450,7 +5450,7 @@
           <a:p>
             <a:fld id="{3CBBBB78-C96F-47B7-AB17-D852CA960AC9}" type="datetimeFigureOut">
               <a:rPr lang="en-US" dirty="0"/>
-              <a:t>5/22/2022</a:t>
+              <a:t>5/23/2022</a:t>
             </a:fld>
             <a:endParaRPr lang="en-US" dirty="0"/>
           </a:p>
@@ -5770,7 +5770,7 @@
           <a:p>
             <a:fld id="{1FA3F48C-C7C6-4055-9F49-3777875E72AE}" type="datetimeFigureOut">
               <a:rPr lang="en-US" dirty="0"/>
-              <a:t>5/22/2022</a:t>
+              <a:t>5/23/2022</a:t>
             </a:fld>
             <a:endParaRPr lang="en-US" dirty="0"/>
           </a:p>
@@ -6041,7 +6041,7 @@
           <a:p>
             <a:fld id="{6178E61D-D431-422C-9764-11DAFE33AB63}" type="datetimeFigureOut">
               <a:rPr lang="en-US" dirty="0"/>
-              <a:t>5/22/2022</a:t>
+              <a:t>5/23/2022</a:t>
             </a:fld>
             <a:endParaRPr lang="en-US" dirty="0"/>
           </a:p>
@@ -6398,7 +6398,7 @@
           <a:p>
             <a:fld id="{78ABE3C1-DBE1-495D-B57B-2849774B866A}" type="datetimeFigureOut">
               <a:rPr lang="en-US" smtClean="0"/>
-              <a:t>5/22/2022</a:t>
+              <a:t>5/23/2022</a:t>
             </a:fld>
             <a:endParaRPr lang="en-US" dirty="0"/>
           </a:p>
@@ -6742,7 +6742,7 @@
           <a:p>
             <a:fld id="{12DE42F4-6EEF-4EF7-8ED4-2208F0F89A08}" type="datetimeFigureOut">
               <a:rPr lang="en-US" smtClean="0"/>
-              <a:t>5/22/2022</a:t>
+              <a:t>5/23/2022</a:t>
             </a:fld>
             <a:endParaRPr lang="en-US" dirty="0"/>
           </a:p>
@@ -7063,7 +7063,7 @@
           <a:p>
             <a:fld id="{12DE42F4-6EEF-4EF7-8ED4-2208F0F89A08}" type="datetimeFigureOut">
               <a:rPr lang="en-US" dirty="0"/>
-              <a:t>5/22/2022</a:t>
+              <a:t>5/23/2022</a:t>
             </a:fld>
             <a:endParaRPr lang="en-US" dirty="0"/>
           </a:p>
@@ -7459,7 +7459,7 @@
           <a:p>
             <a:fld id="{30578ACC-22D6-47C1-A373-4FD133E34F3C}" type="datetimeFigureOut">
               <a:rPr lang="en-US" smtClean="0"/>
-              <a:t>5/22/2022</a:t>
+              <a:t>5/23/2022</a:t>
             </a:fld>
             <a:endParaRPr lang="en-US" dirty="0"/>
           </a:p>
@@ -7847,7 +7847,7 @@
           <a:p>
             <a:fld id="{4E5A6C69-6797-4E8A-BF37-F2C3751466E9}" type="datetimeFigureOut">
               <a:rPr lang="en-US" smtClean="0"/>
-              <a:t>5/22/2022</a:t>
+              <a:t>5/23/2022</a:t>
             </a:fld>
             <a:endParaRPr lang="en-US" dirty="0"/>
           </a:p>
@@ -8365,7 +8365,7 @@
           <a:p>
             <a:fld id="{D82014A1-A632-4878-A0D3-F52BA7563730}" type="datetimeFigureOut">
               <a:rPr lang="en-US" smtClean="0"/>
-              <a:t>5/22/2022</a:t>
+              <a:t>5/23/2022</a:t>
             </a:fld>
             <a:endParaRPr lang="en-US" dirty="0"/>
           </a:p>
@@ -8634,7 +8634,7 @@
           <a:p>
             <a:fld id="{CE99F462-093F-4566-844B-4C71F2739DA5}" type="datetimeFigureOut">
               <a:rPr lang="en-US" smtClean="0"/>
-              <a:t>5/22/2022</a:t>
+              <a:t>5/23/2022</a:t>
             </a:fld>
             <a:endParaRPr lang="en-US" dirty="0"/>
           </a:p>
@@ -8809,7 +8809,7 @@
           <a:p>
             <a:fld id="{3D24A7AC-904D-4781-85BA-7D10C17ED021}" type="datetimeFigureOut">
               <a:rPr lang="en-US" smtClean="0"/>
-              <a:t>5/22/2022</a:t>
+              <a:t>5/23/2022</a:t>
             </a:fld>
             <a:endParaRPr lang="en-US" dirty="0"/>
           </a:p>
@@ -9211,7 +9211,7 @@
           <a:p>
             <a:fld id="{E331444B-B92B-4E27-8C94-BB93EAF5CB18}" type="datetimeFigureOut">
               <a:rPr lang="en-US" smtClean="0"/>
-              <a:t>5/22/2022</a:t>
+              <a:t>5/23/2022</a:t>
             </a:fld>
             <a:endParaRPr lang="en-US" dirty="0"/>
           </a:p>
@@ -9632,7 +9632,7 @@
           <a:p>
             <a:fld id="{363EFA5E-FA76-400D-B3DC-F0BA90E6D107}" type="datetimeFigureOut">
               <a:rPr lang="en-US" smtClean="0"/>
-              <a:t>5/22/2022</a:t>
+              <a:t>5/23/2022</a:t>
             </a:fld>
             <a:endParaRPr lang="en-US" dirty="0"/>
           </a:p>
@@ -10053,7 +10053,7 @@
           <a:p>
             <a:fld id="{446C117F-5CCF-4837-BE5F-2B92066CAFAF}" type="datetimeFigureOut">
               <a:rPr lang="en-US" smtClean="0"/>
-              <a:t>5/22/2022</a:t>
+              <a:t>5/23/2022</a:t>
             </a:fld>
             <a:endParaRPr lang="en-US" dirty="0"/>
           </a:p>
@@ -10401,7 +10401,7 @@
           <a:p>
             <a:fld id="{84EB90BD-B6CE-46B7-997F-7313B992CCDC}" type="datetimeFigureOut">
               <a:rPr lang="en-US" smtClean="0"/>
-              <a:t>5/22/2022</a:t>
+              <a:t>5/23/2022</a:t>
             </a:fld>
             <a:endParaRPr lang="en-US" dirty="0"/>
           </a:p>
@@ -10818,7 +10818,7 @@
           <a:p>
             <a:fld id="{CDB9D11F-B188-461D-B23F-39381795C052}" type="datetimeFigureOut">
               <a:rPr lang="en-US" smtClean="0"/>
-              <a:t>5/22/2022</a:t>
+              <a:t>5/23/2022</a:t>
             </a:fld>
             <a:endParaRPr lang="en-US" dirty="0"/>
           </a:p>
@@ -11456,7 +11456,7 @@
           <a:p>
             <a:fld id="{30578ACC-22D6-47C1-A373-4FD133E34F3C}" type="datetimeFigureOut">
               <a:rPr lang="en-US" dirty="0"/>
-              <a:t>5/22/2022</a:t>
+              <a:t>5/23/2022</a:t>
             </a:fld>
             <a:endParaRPr lang="en-US" dirty="0"/>
           </a:p>
@@ -11799,7 +11799,7 @@
           <a:p>
             <a:fld id="{52E6D8D9-55A2-4063-B0F3-121F44549695}" type="datetimeFigureOut">
               <a:rPr lang="en-US" smtClean="0"/>
-              <a:t>5/22/2022</a:t>
+              <a:t>5/23/2022</a:t>
             </a:fld>
             <a:endParaRPr lang="en-US" dirty="0"/>
           </a:p>
@@ -12492,7 +12492,7 @@
           <a:p>
             <a:fld id="{D4B24536-994D-4021-A283-9F449C0DB509}" type="datetimeFigureOut">
               <a:rPr lang="en-US" smtClean="0"/>
-              <a:t>5/22/2022</a:t>
+              <a:t>5/23/2022</a:t>
             </a:fld>
             <a:endParaRPr lang="en-US" dirty="0"/>
           </a:p>
@@ -13417,7 +13417,7 @@
           <a:p>
             <a:fld id="{3CBBBB78-C96F-47B7-AB17-D852CA960AC9}" type="datetimeFigureOut">
               <a:rPr lang="en-US" smtClean="0"/>
-              <a:t>5/22/2022</a:t>
+              <a:t>5/23/2022</a:t>
             </a:fld>
             <a:endParaRPr lang="en-US" dirty="0"/>
           </a:p>
@@ -13742,7 +13742,7 @@
           <a:p>
             <a:fld id="{1FA3F48C-C7C6-4055-9F49-3777875E72AE}" type="datetimeFigureOut">
               <a:rPr lang="en-US" smtClean="0"/>
-              <a:t>5/22/2022</a:t>
+              <a:t>5/23/2022</a:t>
             </a:fld>
             <a:endParaRPr lang="en-US" dirty="0"/>
           </a:p>
@@ -14018,7 +14018,7 @@
           <a:p>
             <a:fld id="{6178E61D-D431-422C-9764-11DAFE33AB63}" type="datetimeFigureOut">
               <a:rPr lang="en-US" smtClean="0"/>
-              <a:t>5/22/2022</a:t>
+              <a:t>5/23/2022</a:t>
             </a:fld>
             <a:endParaRPr lang="en-US" dirty="0"/>
           </a:p>
@@ -14380,7 +14380,7 @@
           <a:p>
             <a:fld id="{78ABE3C1-DBE1-495D-B57B-2849774B866A}" type="datetimeFigureOut">
               <a:rPr lang="en-US" smtClean="0"/>
-              <a:t>5/22/2022</a:t>
+              <a:t>5/23/2022</a:t>
             </a:fld>
             <a:endParaRPr lang="en-US" dirty="0"/>
           </a:p>
@@ -14706,7 +14706,7 @@
           <a:p>
             <a:fld id="{12DE42F4-6EEF-4EF7-8ED4-2208F0F89A08}" type="datetimeFigureOut">
               <a:rPr lang="en-US" smtClean="0"/>
-              <a:t>5/22/2022</a:t>
+              <a:t>5/23/2022</a:t>
             </a:fld>
             <a:endParaRPr lang="en-US" dirty="0"/>
           </a:p>
@@ -15107,7 +15107,7 @@
           <a:p>
             <a:fld id="{30578ACC-22D6-47C1-A373-4FD133E34F3C}" type="datetimeFigureOut">
               <a:rPr lang="en-US" smtClean="0"/>
-              <a:t>5/22/2022</a:t>
+              <a:t>5/23/2022</a:t>
             </a:fld>
             <a:endParaRPr lang="en-US" dirty="0"/>
           </a:p>
@@ -15495,7 +15495,7 @@
           <a:p>
             <a:fld id="{4E5A6C69-6797-4E8A-BF37-F2C3751466E9}" type="datetimeFigureOut">
               <a:rPr lang="en-US" smtClean="0"/>
-              <a:t>5/22/2022</a:t>
+              <a:t>5/23/2022</a:t>
             </a:fld>
             <a:endParaRPr lang="en-US" dirty="0"/>
           </a:p>
@@ -16013,7 +16013,7 @@
           <a:p>
             <a:fld id="{D82014A1-A632-4878-A0D3-F52BA7563730}" type="datetimeFigureOut">
               <a:rPr lang="en-US" smtClean="0"/>
-              <a:t>5/22/2022</a:t>
+              <a:t>5/23/2022</a:t>
             </a:fld>
             <a:endParaRPr lang="en-US" dirty="0"/>
           </a:p>
@@ -16396,7 +16396,7 @@
           <a:p>
             <a:fld id="{4E5A6C69-6797-4E8A-BF37-F2C3751466E9}" type="datetimeFigureOut">
               <a:rPr lang="en-US" dirty="0"/>
-              <a:t>5/22/2022</a:t>
+              <a:t>5/23/2022</a:t>
             </a:fld>
             <a:endParaRPr lang="en-US" dirty="0"/>
           </a:p>
@@ -16660,7 +16660,7 @@
           <a:p>
             <a:fld id="{CE99F462-093F-4566-844B-4C71F2739DA5}" type="datetimeFigureOut">
               <a:rPr lang="en-US" smtClean="0"/>
-              <a:t>5/22/2022</a:t>
+              <a:t>5/23/2022</a:t>
             </a:fld>
             <a:endParaRPr lang="en-US" dirty="0"/>
           </a:p>
@@ -16835,7 +16835,7 @@
           <a:p>
             <a:fld id="{3D24A7AC-904D-4781-85BA-7D10C17ED021}" type="datetimeFigureOut">
               <a:rPr lang="en-US" smtClean="0"/>
-              <a:t>5/22/2022</a:t>
+              <a:t>5/23/2022</a:t>
             </a:fld>
             <a:endParaRPr lang="en-US" dirty="0"/>
           </a:p>
@@ -17237,7 +17237,7 @@
           <a:p>
             <a:fld id="{E331444B-B92B-4E27-8C94-BB93EAF5CB18}" type="datetimeFigureOut">
               <a:rPr lang="en-US" smtClean="0"/>
-              <a:t>5/22/2022</a:t>
+              <a:t>5/23/2022</a:t>
             </a:fld>
             <a:endParaRPr lang="en-US" dirty="0"/>
           </a:p>
@@ -17658,7 +17658,7 @@
           <a:p>
             <a:fld id="{363EFA5E-FA76-400D-B3DC-F0BA90E6D107}" type="datetimeFigureOut">
               <a:rPr lang="en-US" smtClean="0"/>
-              <a:t>5/22/2022</a:t>
+              <a:t>5/23/2022</a:t>
             </a:fld>
             <a:endParaRPr lang="en-US" dirty="0"/>
           </a:p>
@@ -18079,7 +18079,7 @@
           <a:p>
             <a:fld id="{446C117F-5CCF-4837-BE5F-2B92066CAFAF}" type="datetimeFigureOut">
               <a:rPr lang="en-US" smtClean="0"/>
-              <a:t>5/22/2022</a:t>
+              <a:t>5/23/2022</a:t>
             </a:fld>
             <a:endParaRPr lang="en-US" dirty="0"/>
           </a:p>
@@ -18427,7 +18427,7 @@
           <a:p>
             <a:fld id="{84EB90BD-B6CE-46B7-997F-7313B992CCDC}" type="datetimeFigureOut">
               <a:rPr lang="en-US" smtClean="0"/>
-              <a:t>5/22/2022</a:t>
+              <a:t>5/23/2022</a:t>
             </a:fld>
             <a:endParaRPr lang="en-US" dirty="0"/>
           </a:p>
@@ -18844,7 +18844,7 @@
           <a:p>
             <a:fld id="{CDB9D11F-B188-461D-B23F-39381795C052}" type="datetimeFigureOut">
               <a:rPr lang="en-US" smtClean="0"/>
-              <a:t>5/22/2022</a:t>
+              <a:t>5/23/2022</a:t>
             </a:fld>
             <a:endParaRPr lang="en-US" dirty="0"/>
           </a:p>
@@ -19424,7 +19424,7 @@
           <a:p>
             <a:fld id="{52E6D8D9-55A2-4063-B0F3-121F44549695}" type="datetimeFigureOut">
               <a:rPr lang="en-US" smtClean="0"/>
-              <a:t>5/22/2022</a:t>
+              <a:t>5/23/2022</a:t>
             </a:fld>
             <a:endParaRPr lang="en-US" dirty="0"/>
           </a:p>
@@ -20117,7 +20117,7 @@
           <a:p>
             <a:fld id="{D4B24536-994D-4021-A283-9F449C0DB509}" type="datetimeFigureOut">
               <a:rPr lang="en-US" smtClean="0"/>
-              <a:t>5/22/2022</a:t>
+              <a:t>5/23/2022</a:t>
             </a:fld>
             <a:endParaRPr lang="en-US" dirty="0"/>
           </a:p>
@@ -21042,7 +21042,7 @@
           <a:p>
             <a:fld id="{3CBBBB78-C96F-47B7-AB17-D852CA960AC9}" type="datetimeFigureOut">
               <a:rPr lang="en-US" smtClean="0"/>
-              <a:t>5/22/2022</a:t>
+              <a:t>5/23/2022</a:t>
             </a:fld>
             <a:endParaRPr lang="en-US" dirty="0"/>
           </a:p>
@@ -21560,7 +21560,7 @@
           <a:p>
             <a:fld id="{D82014A1-A632-4878-A0D3-F52BA7563730}" type="datetimeFigureOut">
               <a:rPr lang="en-US" dirty="0"/>
-              <a:t>5/22/2022</a:t>
+              <a:t>5/23/2022</a:t>
             </a:fld>
             <a:endParaRPr lang="en-US" dirty="0"/>
           </a:p>
@@ -21880,7 +21880,7 @@
           <a:p>
             <a:fld id="{1FA3F48C-C7C6-4055-9F49-3777875E72AE}" type="datetimeFigureOut">
               <a:rPr lang="en-US" smtClean="0"/>
-              <a:t>5/22/2022</a:t>
+              <a:t>5/23/2022</a:t>
             </a:fld>
             <a:endParaRPr lang="en-US" dirty="0"/>
           </a:p>
@@ -22156,7 +22156,7 @@
           <a:p>
             <a:fld id="{6178E61D-D431-422C-9764-11DAFE33AB63}" type="datetimeFigureOut">
               <a:rPr lang="en-US" smtClean="0"/>
-              <a:t>5/22/2022</a:t>
+              <a:t>5/23/2022</a:t>
             </a:fld>
             <a:endParaRPr lang="en-US" dirty="0"/>
           </a:p>
@@ -22518,7 +22518,7 @@
           <a:p>
             <a:fld id="{78ABE3C1-DBE1-495D-B57B-2849774B866A}" type="datetimeFigureOut">
               <a:rPr lang="en-US" smtClean="0"/>
-              <a:t>5/22/2022</a:t>
+              <a:t>5/23/2022</a:t>
             </a:fld>
             <a:endParaRPr lang="en-US" dirty="0"/>
           </a:p>
@@ -22844,7 +22844,7 @@
           <a:p>
             <a:fld id="{12DE42F4-6EEF-4EF7-8ED4-2208F0F89A08}" type="datetimeFigureOut">
               <a:rPr lang="en-US" smtClean="0"/>
-              <a:t>5/22/2022</a:t>
+              <a:t>5/23/2022</a:t>
             </a:fld>
             <a:endParaRPr lang="en-US" dirty="0"/>
           </a:p>
@@ -23245,7 +23245,7 @@
           <a:p>
             <a:fld id="{30578ACC-22D6-47C1-A373-4FD133E34F3C}" type="datetimeFigureOut">
               <a:rPr lang="en-US" smtClean="0"/>
-              <a:t>5/22/2022</a:t>
+              <a:t>5/23/2022</a:t>
             </a:fld>
             <a:endParaRPr lang="en-US" dirty="0"/>
           </a:p>
@@ -23633,7 +23633,7 @@
           <a:p>
             <a:fld id="{4E5A6C69-6797-4E8A-BF37-F2C3751466E9}" type="datetimeFigureOut">
               <a:rPr lang="en-US" smtClean="0"/>
-              <a:t>5/22/2022</a:t>
+              <a:t>5/23/2022</a:t>
             </a:fld>
             <a:endParaRPr lang="en-US" dirty="0"/>
           </a:p>
@@ -24151,7 +24151,7 @@
           <a:p>
             <a:fld id="{D82014A1-A632-4878-A0D3-F52BA7563730}" type="datetimeFigureOut">
               <a:rPr lang="en-US" smtClean="0"/>
-              <a:t>5/22/2022</a:t>
+              <a:t>5/23/2022</a:t>
             </a:fld>
             <a:endParaRPr lang="en-US" dirty="0"/>
           </a:p>
@@ -24420,7 +24420,7 @@
           <a:p>
             <a:fld id="{CE99F462-093F-4566-844B-4C71F2739DA5}" type="datetimeFigureOut">
               <a:rPr lang="en-US" smtClean="0"/>
-              <a:t>5/22/2022</a:t>
+              <a:t>5/23/2022</a:t>
             </a:fld>
             <a:endParaRPr lang="en-US" dirty="0"/>
           </a:p>
@@ -24595,7 +24595,7 @@
           <a:p>
             <a:fld id="{3D24A7AC-904D-4781-85BA-7D10C17ED021}" type="datetimeFigureOut">
               <a:rPr lang="en-US" smtClean="0"/>
-              <a:t>5/22/2022</a:t>
+              <a:t>5/23/2022</a:t>
             </a:fld>
             <a:endParaRPr lang="en-US" dirty="0"/>
           </a:p>
@@ -24997,7 +24997,7 @@
           <a:p>
             <a:fld id="{E331444B-B92B-4E27-8C94-BB93EAF5CB18}" type="datetimeFigureOut">
               <a:rPr lang="en-US" smtClean="0"/>
-              <a:t>5/22/2022</a:t>
+              <a:t>5/23/2022</a:t>
             </a:fld>
             <a:endParaRPr lang="en-US" dirty="0"/>
           </a:p>
@@ -25266,7 +25266,7 @@
           <a:p>
             <a:fld id="{CE99F462-093F-4566-844B-4C71F2739DA5}" type="datetimeFigureOut">
               <a:rPr lang="en-US" dirty="0"/>
-              <a:t>5/22/2022</a:t>
+              <a:t>5/23/2022</a:t>
             </a:fld>
             <a:endParaRPr lang="en-US" dirty="0"/>
           </a:p>
@@ -25682,7 +25682,7 @@
           <a:p>
             <a:fld id="{363EFA5E-FA76-400D-B3DC-F0BA90E6D107}" type="datetimeFigureOut">
               <a:rPr lang="en-US" smtClean="0"/>
-              <a:t>5/22/2022</a:t>
+              <a:t>5/23/2022</a:t>
             </a:fld>
             <a:endParaRPr lang="en-US" dirty="0"/>
           </a:p>
@@ -26103,7 +26103,7 @@
           <a:p>
             <a:fld id="{446C117F-5CCF-4837-BE5F-2B92066CAFAF}" type="datetimeFigureOut">
               <a:rPr lang="en-US" smtClean="0"/>
-              <a:t>5/22/2022</a:t>
+              <a:t>5/23/2022</a:t>
             </a:fld>
             <a:endParaRPr lang="en-US" dirty="0"/>
           </a:p>
@@ -26451,7 +26451,7 @@
           <a:p>
             <a:fld id="{84EB90BD-B6CE-46B7-997F-7313B992CCDC}" type="datetimeFigureOut">
               <a:rPr lang="en-US" smtClean="0"/>
-              <a:t>5/22/2022</a:t>
+              <a:t>5/23/2022</a:t>
             </a:fld>
             <a:endParaRPr lang="en-US" dirty="0"/>
           </a:p>
@@ -26868,7 +26868,7 @@
           <a:p>
             <a:fld id="{CDB9D11F-B188-461D-B23F-39381795C052}" type="datetimeFigureOut">
               <a:rPr lang="en-US" smtClean="0"/>
-              <a:t>5/22/2022</a:t>
+              <a:t>5/23/2022</a:t>
             </a:fld>
             <a:endParaRPr lang="en-US" dirty="0"/>
           </a:p>
@@ -27448,7 +27448,7 @@
           <a:p>
             <a:fld id="{52E6D8D9-55A2-4063-B0F3-121F44549695}" type="datetimeFigureOut">
               <a:rPr lang="en-US" smtClean="0"/>
-              <a:t>5/22/2022</a:t>
+              <a:t>5/23/2022</a:t>
             </a:fld>
             <a:endParaRPr lang="en-US" dirty="0"/>
           </a:p>
@@ -28141,7 +28141,7 @@
           <a:p>
             <a:fld id="{D4B24536-994D-4021-A283-9F449C0DB509}" type="datetimeFigureOut">
               <a:rPr lang="en-US" smtClean="0"/>
-              <a:t>5/22/2022</a:t>
+              <a:t>5/23/2022</a:t>
             </a:fld>
             <a:endParaRPr lang="en-US" dirty="0"/>
           </a:p>
@@ -29066,7 +29066,7 @@
           <a:p>
             <a:fld id="{3CBBBB78-C96F-47B7-AB17-D852CA960AC9}" type="datetimeFigureOut">
               <a:rPr lang="en-US" smtClean="0"/>
-              <a:t>5/22/2022</a:t>
+              <a:t>5/23/2022</a:t>
             </a:fld>
             <a:endParaRPr lang="en-US" dirty="0"/>
           </a:p>
@@ -29391,7 +29391,7 @@
           <a:p>
             <a:fld id="{1FA3F48C-C7C6-4055-9F49-3777875E72AE}" type="datetimeFigureOut">
               <a:rPr lang="en-US" smtClean="0"/>
-              <a:t>5/22/2022</a:t>
+              <a:t>5/23/2022</a:t>
             </a:fld>
             <a:endParaRPr lang="en-US" dirty="0"/>
           </a:p>
@@ -29667,7 +29667,7 @@
           <a:p>
             <a:fld id="{6178E61D-D431-422C-9764-11DAFE33AB63}" type="datetimeFigureOut">
               <a:rPr lang="en-US" smtClean="0"/>
-              <a:t>5/22/2022</a:t>
+              <a:t>5/23/2022</a:t>
             </a:fld>
             <a:endParaRPr lang="en-US" dirty="0"/>
           </a:p>
@@ -29857,7 +29857,7 @@
           <a:p>
             <a:fld id="{3D24A7AC-904D-4781-85BA-7D10C17ED021}" type="datetimeFigureOut">
               <a:rPr lang="en-US" dirty="0"/>
-              <a:t>5/22/2022</a:t>
+              <a:t>5/23/2022</a:t>
             </a:fld>
             <a:endParaRPr lang="en-US" dirty="0"/>
           </a:p>
@@ -30254,7 +30254,7 @@
           <a:p>
             <a:fld id="{E331444B-B92B-4E27-8C94-BB93EAF5CB18}" type="datetimeFigureOut">
               <a:rPr lang="en-US" dirty="0"/>
-              <a:t>5/22/2022</a:t>
+              <a:t>5/23/2022</a:t>
             </a:fld>
             <a:endParaRPr lang="en-US" dirty="0"/>
           </a:p>
@@ -30670,7 +30670,7 @@
           <a:p>
             <a:fld id="{363EFA5E-FA76-400D-B3DC-F0BA90E6D107}" type="datetimeFigureOut">
               <a:rPr lang="en-US" dirty="0"/>
-              <a:t>5/22/2022</a:t>
+              <a:t>5/23/2022</a:t>
             </a:fld>
             <a:endParaRPr lang="en-US" dirty="0"/>
           </a:p>
@@ -30921,7 +30921,7 @@
           <a:p>
             <a:fld id="{9D6E9DEC-419B-4CC5-A080-3B06BD5A8291}" type="datetimeFigureOut">
               <a:rPr lang="en-US" dirty="0"/>
-              <a:t>5/22/2022</a:t>
+              <a:t>5/23/2022</a:t>
             </a:fld>
             <a:endParaRPr lang="en-US" dirty="0"/>
           </a:p>
@@ -31507,7 +31507,7 @@
           <a:p>
             <a:fld id="{9D6E9DEC-419B-4CC5-A080-3B06BD5A8291}" type="datetimeFigureOut">
               <a:rPr lang="en-US" smtClean="0"/>
-              <a:t>5/22/2022</a:t>
+              <a:t>5/23/2022</a:t>
             </a:fld>
             <a:endParaRPr lang="en-US" dirty="0"/>
           </a:p>
@@ -32133,7 +32133,7 @@
           <a:p>
             <a:fld id="{9D6E9DEC-419B-4CC5-A080-3B06BD5A8291}" type="datetimeFigureOut">
               <a:rPr lang="en-US" smtClean="0"/>
-              <a:t>5/22/2022</a:t>
+              <a:t>5/23/2022</a:t>
             </a:fld>
             <a:endParaRPr lang="en-US" dirty="0"/>
           </a:p>
@@ -32724,7 +32724,7 @@
           <a:p>
             <a:fld id="{9D6E9DEC-419B-4CC5-A080-3B06BD5A8291}" type="datetimeFigureOut">
               <a:rPr lang="en-US" smtClean="0"/>
-              <a:t>5/22/2022</a:t>
+              <a:t>5/23/2022</a:t>
             </a:fld>
             <a:endParaRPr lang="en-US" dirty="0"/>
           </a:p>
@@ -35379,7 +35379,14 @@
           <a:p>
             <a:r>
               <a:rPr lang="en-US" dirty="0"/>
-              <a:t>Two ways</a:t>
+              <a:t>Users upload their image first. </a:t>
+            </a:r>
+            <a:br>
+              <a:rPr lang="en-US" dirty="0"/>
+            </a:br>
+            <a:r>
+              <a:rPr lang="en-US" dirty="0"/>
+              <a:t>Then choose the way they want</a:t>
             </a:r>
           </a:p>
         </p:txBody>
@@ -35486,7 +35493,7 @@
           <a:p>
             <a:r>
               <a:rPr lang="en-US" dirty="0"/>
-              <a:t>Two ways</a:t>
+              <a:t>Users upload their image and get the result</a:t>
             </a:r>
           </a:p>
         </p:txBody>

</xml_diff>